<commit_message>
Add a lot of comments
</commit_message>
<xml_diff>
--- a/Meilander_URAC_Poster_2020.pptx
+++ b/Meilander_URAC_Poster_2020.pptx
@@ -2887,7 +2887,7 @@
         <p:spPr>
           <a:xfrm>
             <a:off x="977635" y="8542136"/>
-            <a:ext cx="10469880" cy="7624584"/>
+            <a:ext cx="10469880" cy="6663460"/>
           </a:xfrm>
           <a:prstGeom prst="rect">
             <a:avLst/>
@@ -2918,8 +2918,8 @@
         </p:nvSpPr>
         <p:spPr>
           <a:xfrm>
-            <a:off x="1022805" y="8685609"/>
-            <a:ext cx="10377825" cy="5493812"/>
+            <a:off x="1088450" y="11412626"/>
+            <a:ext cx="10377825" cy="507831"/>
           </a:xfrm>
           <a:prstGeom prst="rect">
             <a:avLst/>
@@ -2945,10 +2945,7 @@
               </a:tabLst>
               <a:defRPr sz="2700"/>
             </a:pPr>
-            <a:r>
-              <a:rPr lang="en-US" sz="2700" dirty="0"/>
-              <a:t>While its name seems indicative of a unique force, a tidal force is really the secondary effect of the gravitational force between two bodies that orbit each other.  The gravity on the sides of the bodies that face each other is greater than on the opposite sides, which tends to result in an elongation of each body along an axis line that connects their centers.  Tidal forces are responsible for many commonly observed phenomena, such as the tides on Earth, tidal heating of bodies in orbit (due to the friction of the bodies repeatedly elongating and contracting), and the tidal locking of bodies in orbit (when the gravitational force by one more massive body on another less massive one is great enough that the less massive body orbits with the same side facing the more massive one at all times).</a:t>
-            </a:r>
+            <a:endParaRPr lang="en-US" sz="2700" dirty="0"/>
           </a:p>
         </p:txBody>
       </p:sp>
@@ -2960,7 +2957,7 @@
         </p:nvSpPr>
         <p:spPr>
           <a:xfrm>
-            <a:off x="1022805" y="26837496"/>
+            <a:off x="32507803" y="14350019"/>
             <a:ext cx="10379542" cy="507831"/>
           </a:xfrm>
           <a:prstGeom prst="rect">
@@ -2989,35 +2986,6 @@
           </a:lstStyle>
           <a:p>
             <a:endParaRPr dirty="0"/>
-          </a:p>
-        </p:txBody>
-      </p:sp>
-      <p:sp>
-        <p:nvSpPr>
-          <p:cNvPr id="106" name="Rectangle 49"/>
-          <p:cNvSpPr/>
-          <p:nvPr/>
-        </p:nvSpPr>
-        <p:spPr>
-          <a:xfrm>
-            <a:off x="12545377" y="7033162"/>
-            <a:ext cx="18811694" cy="24579744"/>
-          </a:xfrm>
-          <a:prstGeom prst="rect">
-            <a:avLst/>
-          </a:prstGeom>
-          <a:ln w="12700">
-            <a:solidFill>
-              <a:srgbClr val="000000"/>
-            </a:solidFill>
-            <a:miter/>
-          </a:ln>
-        </p:spPr>
-        <p:txBody>
-          <a:bodyPr lIns="45719" rIns="45719" anchor="ctr"/>
-          <a:lstStyle/>
-          <a:p>
-            <a:endParaRPr/>
           </a:p>
         </p:txBody>
       </p:sp>
@@ -3104,8 +3072,8 @@
         </p:nvSpPr>
         <p:spPr>
           <a:xfrm>
-            <a:off x="958689" y="24701878"/>
-            <a:ext cx="10469880" cy="6911028"/>
+            <a:off x="32443687" y="12214401"/>
+            <a:ext cx="10379542" cy="5484923"/>
           </a:xfrm>
           <a:prstGeom prst="rect">
             <a:avLst/>
@@ -3204,38 +3172,6 @@
               <a:defRPr sz="2400"/>
             </a:pPr>
             <a:endParaRPr/>
-          </a:p>
-        </p:txBody>
-      </p:sp>
-      <p:sp>
-        <p:nvSpPr>
-          <p:cNvPr id="118" name="Rectangle 18"/>
-          <p:cNvSpPr/>
-          <p:nvPr/>
-        </p:nvSpPr>
-        <p:spPr>
-          <a:xfrm>
-            <a:off x="977635" y="17917010"/>
-            <a:ext cx="10469880" cy="4802002"/>
-          </a:xfrm>
-          <a:prstGeom prst="rect">
-            <a:avLst/>
-          </a:prstGeom>
-          <a:ln w="12700">
-            <a:solidFill>
-              <a:srgbClr val="000000"/>
-            </a:solidFill>
-            <a:miter/>
-          </a:ln>
-        </p:spPr>
-        <p:txBody>
-          <a:bodyPr lIns="45719" rIns="45719"/>
-          <a:lstStyle/>
-          <a:p>
-            <a:pPr>
-              <a:defRPr sz="2400"/>
-            </a:pPr>
-            <a:endParaRPr dirty="0"/>
           </a:p>
         </p:txBody>
       </p:sp>
@@ -3289,7 +3225,7 @@
         <p:spPr>
           <a:xfrm>
             <a:off x="32558343" y="30103042"/>
-            <a:ext cx="10343011" cy="892762"/>
+            <a:ext cx="10343011" cy="1308260"/>
           </a:xfrm>
           <a:prstGeom prst="rect">
             <a:avLst/>
@@ -3320,7 +3256,15 @@
           <a:p>
             <a:r>
               <a:rPr lang="en-US" sz="2700" dirty="0"/>
-              <a:t>I would like to thank Dr. Rob Knop for his assistance both in and out of the classroom.</a:t>
+              <a:t>I would like to thank Dr. Rob Knop for his assistance both in and out of the classroom. Also, the use of his </a:t>
+            </a:r>
+            <a:r>
+              <a:rPr lang="en-US" sz="2700" dirty="0" err="1"/>
+              <a:t>physvis</a:t>
+            </a:r>
+            <a:r>
+              <a:rPr lang="en-US" sz="2700" dirty="0"/>
+              <a:t> program was pivotal to the visualization of this project.</a:t>
             </a:r>
             <a:endParaRPr sz="2700" dirty="0"/>
           </a:p>
@@ -3376,7 +3320,7 @@
         </p:nvSpPr>
         <p:spPr>
           <a:xfrm>
-            <a:off x="32436173" y="12288678"/>
+            <a:off x="32369264" y="19011145"/>
             <a:ext cx="10308974" cy="492653"/>
           </a:xfrm>
           <a:prstGeom prst="rect">
@@ -3450,8 +3394,8 @@
         </p:nvSpPr>
         <p:spPr>
           <a:xfrm>
-            <a:off x="32473879" y="23388024"/>
-            <a:ext cx="10467977" cy="5552133"/>
+            <a:off x="32473879" y="26915888"/>
+            <a:ext cx="10467977" cy="2024269"/>
           </a:xfrm>
           <a:prstGeom prst="rect">
             <a:avLst/>
@@ -3482,8 +3426,8 @@
         </p:nvSpPr>
         <p:spPr>
           <a:xfrm>
-            <a:off x="32473879" y="11930190"/>
-            <a:ext cx="10469880" cy="10112024"/>
+            <a:off x="32406970" y="18652657"/>
+            <a:ext cx="10469880" cy="6663460"/>
           </a:xfrm>
           <a:prstGeom prst="rect">
             <a:avLst/>
@@ -3514,8 +3458,8 @@
         </p:nvSpPr>
         <p:spPr>
           <a:xfrm>
-            <a:off x="32473879" y="6305286"/>
-            <a:ext cx="10469880" cy="4640183"/>
+            <a:off x="32473879" y="6151268"/>
+            <a:ext cx="10469880" cy="4794201"/>
           </a:xfrm>
           <a:prstGeom prst="rect">
             <a:avLst/>
@@ -3534,7 +3478,7 @@
             <a:pPr>
               <a:defRPr sz="2400"/>
             </a:pPr>
-            <a:endParaRPr/>
+            <a:endParaRPr sz="2700" dirty="0"/>
           </a:p>
         </p:txBody>
       </p:sp>
@@ -3670,75 +3614,6 @@
       </p:sp>
       <p:sp>
         <p:nvSpPr>
-          <p:cNvPr id="17" name="Rectangle 89">
-            <a:extLst>
-              <a:ext uri="{FF2B5EF4-FFF2-40B4-BE49-F238E27FC236}">
-                <a16:creationId xmlns:a16="http://schemas.microsoft.com/office/drawing/2014/main" id="{7FB38462-108B-1543-A1EB-B00A1412CD64}"/>
-              </a:ext>
-            </a:extLst>
-          </p:cNvPr>
-          <p:cNvSpPr>
-            <a:spLocks noChangeArrowheads="1"/>
-          </p:cNvSpPr>
-          <p:nvPr/>
-        </p:nvSpPr>
-        <p:spPr bwMode="auto">
-          <a:xfrm>
-            <a:off x="8289545" y="8378759"/>
-            <a:ext cx="43891200" cy="0"/>
-          </a:xfrm>
-          <a:prstGeom prst="rect">
-            <a:avLst/>
-          </a:prstGeom>
-          <a:noFill/>
-          <a:ln>
-            <a:noFill/>
-          </a:ln>
-          <a:effectLst/>
-          <a:extLst>
-            <a:ext uri="{909E8E84-426E-40DD-AFC4-6F175D3DCCD1}">
-              <a14:hiddenFill xmlns:a14="http://schemas.microsoft.com/office/drawing/2010/main">
-                <a:solidFill>
-                  <a:schemeClr val="accent1"/>
-                </a:solidFill>
-              </a14:hiddenFill>
-            </a:ext>
-            <a:ext uri="{91240B29-F687-4F45-9708-019B960494DF}">
-              <a14:hiddenLine xmlns:a14="http://schemas.microsoft.com/office/drawing/2010/main" w="9525">
-                <a:solidFill>
-                  <a:schemeClr val="tx1"/>
-                </a:solidFill>
-                <a:miter lim="800000"/>
-                <a:headEnd/>
-                <a:tailEnd/>
-              </a14:hiddenLine>
-            </a:ext>
-            <a:ext uri="{AF507438-7753-43E0-B8FC-AC1667EBCBE1}">
-              <a14:hiddenEffects xmlns:a14="http://schemas.microsoft.com/office/drawing/2010/main">
-                <a:effectLst>
-                  <a:outerShdw dist="35921" dir="2700000" algn="ctr" rotWithShape="0">
-                    <a:schemeClr val="bg2"/>
-                  </a:outerShdw>
-                </a:effectLst>
-              </a14:hiddenEffects>
-            </a:ext>
-          </a:extLst>
-        </p:spPr>
-        <p:txBody>
-          <a:bodyPr vert="horz" wrap="none" lIns="91440" tIns="45720" rIns="91440" bIns="45720" numCol="1" anchor="ctr" anchorCtr="0" compatLnSpc="1">
-            <a:prstTxWarp prst="textNoShape">
-              <a:avLst/>
-            </a:prstTxWarp>
-            <a:spAutoFit/>
-          </a:bodyPr>
-          <a:lstStyle/>
-          <a:p>
-            <a:endParaRPr lang="en-US"/>
-          </a:p>
-        </p:txBody>
-      </p:sp>
-      <p:sp>
-        <p:nvSpPr>
           <p:cNvPr id="64" name="Rectangle">
             <a:extLst>
               <a:ext uri="{FF2B5EF4-FFF2-40B4-BE49-F238E27FC236}">
@@ -3804,7 +3679,60 @@
         </p:nvSpPr>
         <p:spPr>
           <a:xfrm>
-            <a:off x="985144" y="17258189"/>
+            <a:off x="12325014" y="5392001"/>
+            <a:ext cx="19032055" cy="715677"/>
+          </a:xfrm>
+          <a:prstGeom prst="rect">
+            <a:avLst/>
+          </a:prstGeom>
+          <a:solidFill>
+            <a:srgbClr val="1F3751"/>
+          </a:solidFill>
+          <a:ln w="57150" cap="flat">
+            <a:noFill/>
+            <a:prstDash val="solid"/>
+            <a:miter lim="800000"/>
+          </a:ln>
+          <a:effectLst/>
+        </p:spPr>
+        <p:txBody>
+          <a:bodyPr wrap="square" lIns="45719" tIns="45719" rIns="45719" bIns="45719" numCol="1" anchor="ctr">
+            <a:noAutofit/>
+          </a:bodyPr>
+          <a:lstStyle/>
+          <a:p>
+            <a:pPr algn="ctr" defTabSz="957262"/>
+            <a:r>
+              <a:rPr lang="en-US" sz="4800" b="1" dirty="0">
+                <a:solidFill>
+                  <a:schemeClr val="bg1"/>
+                </a:solidFill>
+              </a:rPr>
+              <a:t>Design 1</a:t>
+            </a:r>
+            <a:endParaRPr sz="4800" b="1" dirty="0">
+              <a:solidFill>
+                <a:schemeClr val="bg1"/>
+              </a:solidFill>
+            </a:endParaRPr>
+          </a:p>
+        </p:txBody>
+      </p:sp>
+      <p:sp>
+        <p:nvSpPr>
+          <p:cNvPr id="66" name="Rectangle">
+            <a:extLst>
+              <a:ext uri="{FF2B5EF4-FFF2-40B4-BE49-F238E27FC236}">
+                <a16:creationId xmlns:a16="http://schemas.microsoft.com/office/drawing/2014/main" id="{98BE463B-0FDC-EA47-B63C-C53923E0C65C}"/>
+              </a:ext>
+            </a:extLst>
+          </p:cNvPr>
+          <p:cNvSpPr/>
+          <p:nvPr/>
+        </p:nvSpPr>
+        <p:spPr>
+          <a:xfrm>
+            <a:off x="32447386" y="11538133"/>
             <a:ext cx="10479024" cy="715677"/>
           </a:xfrm>
           <a:prstGeom prst="rect">
@@ -3827,51 +3755,14 @@
           <a:lstStyle/>
           <a:p>
             <a:pPr algn="ctr" defTabSz="957262"/>
-            <a:endParaRPr sz="4800" b="1" dirty="0">
-              <a:solidFill>
-                <a:schemeClr val="bg1"/>
-              </a:solidFill>
-            </a:endParaRPr>
-          </a:p>
-        </p:txBody>
-      </p:sp>
-      <p:sp>
-        <p:nvSpPr>
-          <p:cNvPr id="66" name="Rectangle">
-            <a:extLst>
-              <a:ext uri="{FF2B5EF4-FFF2-40B4-BE49-F238E27FC236}">
-                <a16:creationId xmlns:a16="http://schemas.microsoft.com/office/drawing/2014/main" id="{98BE463B-0FDC-EA47-B63C-C53923E0C65C}"/>
-              </a:ext>
-            </a:extLst>
-          </p:cNvPr>
-          <p:cNvSpPr/>
-          <p:nvPr/>
-        </p:nvSpPr>
-        <p:spPr>
-          <a:xfrm>
-            <a:off x="962388" y="24025610"/>
-            <a:ext cx="10479024" cy="715677"/>
-          </a:xfrm>
-          <a:prstGeom prst="rect">
-            <a:avLst/>
-          </a:prstGeom>
-          <a:solidFill>
-            <a:srgbClr val="1F3751"/>
-          </a:solidFill>
-          <a:ln w="57150" cap="flat">
-            <a:noFill/>
-            <a:prstDash val="solid"/>
-            <a:miter lim="800000"/>
-          </a:ln>
-          <a:effectLst/>
-        </p:spPr>
-        <p:txBody>
-          <a:bodyPr wrap="square" lIns="45719" tIns="45719" rIns="45719" bIns="45719" numCol="1" anchor="ctr">
-            <a:noAutofit/>
-          </a:bodyPr>
-          <a:lstStyle/>
-          <a:p>
-            <a:pPr algn="ctr" defTabSz="957262"/>
+            <a:r>
+              <a:rPr lang="en-US" sz="4800" b="1" dirty="0">
+                <a:solidFill>
+                  <a:schemeClr val="bg1"/>
+                </a:solidFill>
+              </a:rPr>
+              <a:t>Problems</a:t>
+            </a:r>
             <a:endParaRPr sz="4800" b="1" dirty="0">
               <a:solidFill>
                 <a:schemeClr val="bg1"/>
@@ -3947,7 +3838,7 @@
         </p:nvSpPr>
         <p:spPr>
           <a:xfrm>
-            <a:off x="32495875" y="22732730"/>
+            <a:off x="32495875" y="26230041"/>
             <a:ext cx="10423524" cy="715677"/>
           </a:xfrm>
           <a:prstGeom prst="rect">
@@ -4002,8 +3893,8 @@
         </p:nvSpPr>
         <p:spPr>
           <a:xfrm>
-            <a:off x="32464735" y="11259235"/>
-            <a:ext cx="10479024" cy="715677"/>
+            <a:off x="32366943" y="18405077"/>
+            <a:ext cx="10608261" cy="759761"/>
           </a:xfrm>
           <a:prstGeom prst="rect">
             <a:avLst/>
@@ -4055,7 +3946,7 @@
         </p:nvSpPr>
         <p:spPr>
           <a:xfrm>
-            <a:off x="32469951" y="5617878"/>
+            <a:off x="32469951" y="5324678"/>
             <a:ext cx="10488168" cy="715677"/>
           </a:xfrm>
           <a:prstGeom prst="rect">
@@ -4078,6 +3969,14 @@
           <a:lstStyle/>
           <a:p>
             <a:pPr algn="ctr" defTabSz="957262"/>
+            <a:r>
+              <a:rPr lang="en-US" sz="4800" b="1" dirty="0">
+                <a:solidFill>
+                  <a:schemeClr val="bg1"/>
+                </a:solidFill>
+              </a:rPr>
+              <a:t>Conclusion</a:t>
+            </a:r>
             <a:endParaRPr sz="4800" b="1" dirty="0">
               <a:solidFill>
                 <a:schemeClr val="bg1"/>
@@ -4100,8 +3999,8 @@
         </p:nvSpPr>
         <p:spPr>
           <a:xfrm>
-            <a:off x="12545377" y="6363928"/>
-            <a:ext cx="18823124" cy="715677"/>
+            <a:off x="12282539" y="16101361"/>
+            <a:ext cx="19112237" cy="715677"/>
           </a:xfrm>
           <a:prstGeom prst="rect">
             <a:avLst/>
@@ -4129,7 +4028,7 @@
                   <a:schemeClr val="bg1"/>
                 </a:solidFill>
               </a:rPr>
-              <a:t>Figures</a:t>
+              <a:t>Design 2</a:t>
             </a:r>
             <a:endParaRPr sz="4800" b="1" dirty="0">
               <a:solidFill>
@@ -4260,7 +4159,7 @@
         </p:nvSpPr>
         <p:spPr>
           <a:xfrm>
-            <a:off x="32569866" y="23598369"/>
+            <a:off x="32576388" y="6650495"/>
             <a:ext cx="10343011" cy="1308260"/>
           </a:xfrm>
           <a:prstGeom prst="rect">
@@ -4316,6 +4215,172 @@
             <a:endParaRPr lang="en-US" sz="2700" dirty="0">
               <a:solidFill>
                 <a:schemeClr val="tx1"/>
+              </a:solidFill>
+            </a:endParaRPr>
+          </a:p>
+        </p:txBody>
+      </p:sp>
+      <p:sp>
+        <p:nvSpPr>
+          <p:cNvPr id="33" name="Text Box 147">
+            <a:extLst>
+              <a:ext uri="{FF2B5EF4-FFF2-40B4-BE49-F238E27FC236}">
+                <a16:creationId xmlns:a16="http://schemas.microsoft.com/office/drawing/2014/main" id="{C1A844E2-D172-4035-B63D-5F2E687CADB3}"/>
+              </a:ext>
+            </a:extLst>
+          </p:cNvPr>
+          <p:cNvSpPr txBox="1"/>
+          <p:nvPr/>
+        </p:nvSpPr>
+        <p:spPr>
+          <a:xfrm>
+            <a:off x="32558343" y="26986614"/>
+            <a:ext cx="10246620" cy="1308260"/>
+          </a:xfrm>
+          <a:prstGeom prst="rect">
+            <a:avLst/>
+          </a:prstGeom>
+          <a:solidFill>
+            <a:schemeClr val="accent3">
+              <a:lumOff val="44000"/>
+            </a:schemeClr>
+          </a:solidFill>
+          <a:ln w="12700">
+            <a:miter lim="400000"/>
+          </a:ln>
+          <a:extLst>
+            <a:ext uri="{C572A759-6A51-4108-AA02-DFA0A04FC94B}">
+              <ma14:wrappingTextBoxFlag xmlns:ma14="http://schemas.microsoft.com/office/mac/drawingml/2011/main" xmlns="" val="1"/>
+            </a:ext>
+          </a:extLst>
+        </p:spPr>
+        <p:txBody>
+          <a:bodyPr wrap="square" lIns="30584" tIns="30584" rIns="30584" bIns="30584">
+            <a:spAutoFit/>
+          </a:bodyPr>
+          <a:lstStyle>
+            <a:lvl1pPr>
+              <a:defRPr sz="2800"/>
+            </a:lvl1pPr>
+          </a:lstStyle>
+          <a:p>
+            <a:r>
+              <a:rPr lang="en-US" sz="2700" dirty="0">
+                <a:solidFill>
+                  <a:schemeClr val="tx1"/>
+                </a:solidFill>
+                <a:hlinkClick r:id="rId3"/>
+              </a:rPr>
+              <a:t>https://www.grc.nasa.gov/WWW/K-12/airplane/atmosmet.html</a:t>
+            </a:r>
+            <a:endParaRPr lang="en-US" sz="2700" dirty="0">
+              <a:solidFill>
+                <a:schemeClr val="tx1"/>
+              </a:solidFill>
+            </a:endParaRPr>
+          </a:p>
+          <a:p>
+            <a:endParaRPr lang="en-US" sz="2700" dirty="0">
+              <a:solidFill>
+                <a:schemeClr val="tx1"/>
+              </a:solidFill>
+            </a:endParaRPr>
+          </a:p>
+          <a:p>
+            <a:endParaRPr lang="en-US" sz="2700" dirty="0">
+              <a:solidFill>
+                <a:schemeClr val="tx1"/>
+              </a:solidFill>
+            </a:endParaRPr>
+          </a:p>
+        </p:txBody>
+      </p:sp>
+      <p:sp>
+        <p:nvSpPr>
+          <p:cNvPr id="34" name="Rectangle 18">
+            <a:extLst>
+              <a:ext uri="{FF2B5EF4-FFF2-40B4-BE49-F238E27FC236}">
+                <a16:creationId xmlns:a16="http://schemas.microsoft.com/office/drawing/2014/main" id="{32104E7C-FBD6-42DA-B956-D4A2C8B19229}"/>
+              </a:ext>
+            </a:extLst>
+          </p:cNvPr>
+          <p:cNvSpPr/>
+          <p:nvPr/>
+        </p:nvSpPr>
+        <p:spPr>
+          <a:xfrm>
+            <a:off x="1067536" y="16760181"/>
+            <a:ext cx="10398740" cy="14852719"/>
+          </a:xfrm>
+          <a:prstGeom prst="rect">
+            <a:avLst/>
+          </a:prstGeom>
+          <a:ln w="12700">
+            <a:solidFill>
+              <a:srgbClr val="000000"/>
+            </a:solidFill>
+            <a:miter/>
+          </a:ln>
+        </p:spPr>
+        <p:txBody>
+          <a:bodyPr lIns="45719" rIns="45719"/>
+          <a:lstStyle/>
+          <a:p>
+            <a:pPr>
+              <a:defRPr sz="2400"/>
+            </a:pPr>
+            <a:endParaRPr dirty="0"/>
+          </a:p>
+        </p:txBody>
+      </p:sp>
+      <p:sp>
+        <p:nvSpPr>
+          <p:cNvPr id="35" name="Rectangle">
+            <a:extLst>
+              <a:ext uri="{FF2B5EF4-FFF2-40B4-BE49-F238E27FC236}">
+                <a16:creationId xmlns:a16="http://schemas.microsoft.com/office/drawing/2014/main" id="{E08F7A3E-2FE3-4610-8892-0782539CB220}"/>
+              </a:ext>
+            </a:extLst>
+          </p:cNvPr>
+          <p:cNvSpPr/>
+          <p:nvPr/>
+        </p:nvSpPr>
+        <p:spPr>
+          <a:xfrm>
+            <a:off x="1071637" y="16101361"/>
+            <a:ext cx="10394638" cy="715677"/>
+          </a:xfrm>
+          <a:prstGeom prst="rect">
+            <a:avLst/>
+          </a:prstGeom>
+          <a:solidFill>
+            <a:srgbClr val="1F3751"/>
+          </a:solidFill>
+          <a:ln w="57150" cap="flat">
+            <a:noFill/>
+            <a:prstDash val="solid"/>
+            <a:miter lim="800000"/>
+          </a:ln>
+          <a:effectLst/>
+        </p:spPr>
+        <p:txBody>
+          <a:bodyPr wrap="square" lIns="45719" tIns="45719" rIns="45719" bIns="45719" numCol="1" anchor="ctr">
+            <a:noAutofit/>
+          </a:bodyPr>
+          <a:lstStyle/>
+          <a:p>
+            <a:pPr algn="ctr" defTabSz="957262"/>
+            <a:r>
+              <a:rPr lang="en-US" sz="4800" b="1" dirty="0">
+                <a:solidFill>
+                  <a:schemeClr val="bg1"/>
+                </a:solidFill>
+              </a:rPr>
+              <a:t>Methods</a:t>
+            </a:r>
+            <a:endParaRPr sz="4800" b="1" dirty="0">
+              <a:solidFill>
+                <a:schemeClr val="bg1"/>
               </a:solidFill>
             </a:endParaRPr>
           </a:p>

</xml_diff>

<commit_message>
smoll changes in plots
</commit_message>
<xml_diff>
--- a/Meilander_URAC_Poster_2020.pptx
+++ b/Meilander_URAC_Poster_2020.pptx
@@ -1934,7 +1934,7 @@
           </a:ln>
           <a:extLst>
             <a:ext uri="{C572A759-6A51-4108-AA02-DFA0A04FC94B}">
-              <ma14:wrappingTextBoxFlag xmlns:ma14="http://schemas.microsoft.com/office/mac/drawingml/2011/main" xmlns="" val="1"/>
+              <ma14:wrappingTextBoxFlag xmlns="" xmlns:ma14="http://schemas.microsoft.com/office/mac/drawingml/2011/main" val="1"/>
             </a:ext>
           </a:extLst>
         </p:spPr>
@@ -1973,7 +1973,7 @@
           </a:ln>
           <a:extLst>
             <a:ext uri="{C572A759-6A51-4108-AA02-DFA0A04FC94B}">
-              <ma14:wrappingTextBoxFlag xmlns:ma14="http://schemas.microsoft.com/office/mac/drawingml/2011/main" xmlns="" val="1"/>
+              <ma14:wrappingTextBoxFlag xmlns="" xmlns:ma14="http://schemas.microsoft.com/office/mac/drawingml/2011/main" val="1"/>
             </a:ext>
           </a:extLst>
         </p:spPr>
@@ -2929,7 +2929,7 @@
           </a:ln>
           <a:extLst>
             <a:ext uri="{C572A759-6A51-4108-AA02-DFA0A04FC94B}">
-              <ma14:wrappingTextBoxFlag xmlns:ma14="http://schemas.microsoft.com/office/mac/drawingml/2011/main" xmlns="" val="1"/>
+              <ma14:wrappingTextBoxFlag xmlns="" xmlns:ma14="http://schemas.microsoft.com/office/mac/drawingml/2011/main" val="1"/>
             </a:ext>
           </a:extLst>
         </p:spPr>
@@ -2968,7 +2968,7 @@
           </a:ln>
           <a:extLst>
             <a:ext uri="{C572A759-6A51-4108-AA02-DFA0A04FC94B}">
-              <ma14:wrappingTextBoxFlag xmlns:ma14="http://schemas.microsoft.com/office/mac/drawingml/2011/main" xmlns="" val="1"/>
+              <ma14:wrappingTextBoxFlag xmlns="" xmlns:ma14="http://schemas.microsoft.com/office/mac/drawingml/2011/main" val="1"/>
             </a:ext>
           </a:extLst>
         </p:spPr>
@@ -3013,7 +3013,7 @@
           </a:ln>
           <a:extLst>
             <a:ext uri="{C572A759-6A51-4108-AA02-DFA0A04FC94B}">
-              <ma14:wrappingTextBoxFlag xmlns:ma14="http://schemas.microsoft.com/office/mac/drawingml/2011/main" xmlns="" val="1"/>
+              <ma14:wrappingTextBoxFlag xmlns="" xmlns:ma14="http://schemas.microsoft.com/office/mac/drawingml/2011/main" val="1"/>
             </a:ext>
           </a:extLst>
         </p:spPr>
@@ -3199,7 +3199,7 @@
           </a:ln>
           <a:extLst>
             <a:ext uri="{C572A759-6A51-4108-AA02-DFA0A04FC94B}">
-              <ma14:wrappingTextBoxFlag xmlns:ma14="http://schemas.microsoft.com/office/mac/drawingml/2011/main" xmlns="" val="1"/>
+              <ma14:wrappingTextBoxFlag xmlns="" xmlns:ma14="http://schemas.microsoft.com/office/mac/drawingml/2011/main" val="1"/>
             </a:ext>
           </a:extLst>
         </p:spPr>
@@ -3240,7 +3240,7 @@
           </a:ln>
           <a:extLst>
             <a:ext uri="{C572A759-6A51-4108-AA02-DFA0A04FC94B}">
-              <ma14:wrappingTextBoxFlag xmlns:ma14="http://schemas.microsoft.com/office/mac/drawingml/2011/main" xmlns="" val="1"/>
+              <ma14:wrappingTextBoxFlag xmlns="" xmlns:ma14="http://schemas.microsoft.com/office/mac/drawingml/2011/main" val="1"/>
             </a:ext>
           </a:extLst>
         </p:spPr>
@@ -3294,7 +3294,7 @@
           </a:ln>
           <a:extLst>
             <a:ext uri="{C572A759-6A51-4108-AA02-DFA0A04FC94B}">
-              <ma14:wrappingTextBoxFlag xmlns:ma14="http://schemas.microsoft.com/office/mac/drawingml/2011/main" xmlns="" val="1"/>
+              <ma14:wrappingTextBoxFlag xmlns="" xmlns:ma14="http://schemas.microsoft.com/office/mac/drawingml/2011/main" val="1"/>
             </a:ext>
           </a:extLst>
         </p:spPr>
@@ -3336,7 +3336,7 @@
           </a:ln>
           <a:extLst>
             <a:ext uri="{C572A759-6A51-4108-AA02-DFA0A04FC94B}">
-              <ma14:wrappingTextBoxFlag xmlns:ma14="http://schemas.microsoft.com/office/mac/drawingml/2011/main" xmlns="" val="1"/>
+              <ma14:wrappingTextBoxFlag xmlns="" xmlns:ma14="http://schemas.microsoft.com/office/mac/drawingml/2011/main" val="1"/>
             </a:ext>
           </a:extLst>
         </p:spPr>
@@ -4175,7 +4175,7 @@
           </a:ln>
           <a:extLst>
             <a:ext uri="{C572A759-6A51-4108-AA02-DFA0A04FC94B}">
-              <ma14:wrappingTextBoxFlag xmlns:ma14="http://schemas.microsoft.com/office/mac/drawingml/2011/main" xmlns="" val="1"/>
+              <ma14:wrappingTextBoxFlag xmlns="" xmlns:ma14="http://schemas.microsoft.com/office/mac/drawingml/2011/main" val="1"/>
             </a:ext>
           </a:extLst>
         </p:spPr>
@@ -4250,7 +4250,7 @@
           </a:ln>
           <a:extLst>
             <a:ext uri="{C572A759-6A51-4108-AA02-DFA0A04FC94B}">
-              <ma14:wrappingTextBoxFlag xmlns:ma14="http://schemas.microsoft.com/office/mac/drawingml/2011/main" xmlns="" val="1"/>
+              <ma14:wrappingTextBoxFlag xmlns="" xmlns:ma14="http://schemas.microsoft.com/office/mac/drawingml/2011/main" val="1"/>
             </a:ext>
           </a:extLst>
         </p:spPr>
@@ -4383,6 +4383,124 @@
                 <a:schemeClr val="bg1"/>
               </a:solidFill>
             </a:endParaRPr>
+          </a:p>
+        </p:txBody>
+      </p:sp>
+      <p:pic>
+        <p:nvPicPr>
+          <p:cNvPr id="3" name="Picture 2" descr="A close up of a map&#10;&#10;Description automatically generated">
+            <a:extLst>
+              <a:ext uri="{FF2B5EF4-FFF2-40B4-BE49-F238E27FC236}">
+                <a16:creationId xmlns:a16="http://schemas.microsoft.com/office/drawing/2014/main" id="{A794AEF5-B208-43F2-83DE-0812A8E26033}"/>
+              </a:ext>
+            </a:extLst>
+          </p:cNvPr>
+          <p:cNvPicPr>
+            <a:picLocks noChangeAspect="1"/>
+          </p:cNvPicPr>
+          <p:nvPr/>
+        </p:nvPicPr>
+        <p:blipFill>
+          <a:blip r:embed="rId4">
+            <a:extLst>
+              <a:ext uri="{28A0092B-C50C-407E-A947-70E740481C1C}">
+                <a14:useLocalDpi xmlns:a14="http://schemas.microsoft.com/office/drawing/2010/main" val="0"/>
+              </a:ext>
+            </a:extLst>
+          </a:blip>
+          <a:stretch>
+            <a:fillRect/>
+          </a:stretch>
+        </p:blipFill>
+        <p:spPr>
+          <a:xfrm>
+            <a:off x="13634713" y="21169547"/>
+            <a:ext cx="10692579" cy="7919192"/>
+          </a:xfrm>
+          <a:prstGeom prst="rect">
+            <a:avLst/>
+          </a:prstGeom>
+        </p:spPr>
+      </p:pic>
+      <p:sp>
+        <p:nvSpPr>
+          <p:cNvPr id="4" name="TextBox 3">
+            <a:extLst>
+              <a:ext uri="{FF2B5EF4-FFF2-40B4-BE49-F238E27FC236}">
+                <a16:creationId xmlns:a16="http://schemas.microsoft.com/office/drawing/2014/main" id="{5387661D-45EF-4241-B7B9-B1C7050EB967}"/>
+              </a:ext>
+            </a:extLst>
+          </p:cNvPr>
+          <p:cNvSpPr txBox="1"/>
+          <p:nvPr/>
+        </p:nvSpPr>
+        <p:spPr>
+          <a:xfrm>
+            <a:off x="17192845" y="20262934"/>
+            <a:ext cx="7655442" cy="1015661"/>
+          </a:xfrm>
+          <a:prstGeom prst="rect">
+            <a:avLst/>
+          </a:prstGeom>
+          <a:noFill/>
+          <a:ln w="12700" cap="flat">
+            <a:noFill/>
+            <a:miter lim="400000"/>
+          </a:ln>
+          <a:effectLst/>
+          <a:sp3d/>
+        </p:spPr>
+        <p:style>
+          <a:lnRef idx="0">
+            <a:scrgbClr r="0" g="0" b="0"/>
+          </a:lnRef>
+          <a:fillRef idx="0">
+            <a:scrgbClr r="0" g="0" b="0"/>
+          </a:fillRef>
+          <a:effectRef idx="0">
+            <a:scrgbClr r="0" g="0" b="0"/>
+          </a:effectRef>
+          <a:fontRef idx="none"/>
+        </p:style>
+        <p:txBody>
+          <a:bodyPr rot="0" spcFirstLastPara="1" vertOverflow="overflow" horzOverflow="overflow" vert="horz" wrap="square" lIns="45719" tIns="45719" rIns="45719" bIns="45719" numCol="1" spcCol="38100" rtlCol="0" anchor="t">
+            <a:spAutoFit/>
+          </a:bodyPr>
+          <a:lstStyle/>
+          <a:p>
+            <a:pPr marL="0" marR="0" indent="0" algn="l" defTabSz="914400" rtl="0" fontAlgn="auto" latinLnBrk="0" hangingPunct="0">
+              <a:lnSpc>
+                <a:spcPct val="100000"/>
+              </a:lnSpc>
+              <a:spcBef>
+                <a:spcPts val="0"/>
+              </a:spcBef>
+              <a:spcAft>
+                <a:spcPts val="0"/>
+              </a:spcAft>
+              <a:buClrTx/>
+              <a:buSzTx/>
+              <a:buFontTx/>
+              <a:buNone/>
+              <a:tabLst/>
+            </a:pPr>
+            <a:r>
+              <a:rPr kumimoji="0" lang="en-US" sz="6000" b="0" i="0" u="none" strike="noStrike" cap="none" spc="0" normalizeH="0" baseline="0" dirty="0">
+                <a:ln>
+                  <a:noFill/>
+                </a:ln>
+                <a:solidFill>
+                  <a:srgbClr val="000000"/>
+                </a:solidFill>
+                <a:effectLst/>
+                <a:uFillTx/>
+                <a:latin typeface="+mn-lt"/>
+                <a:ea typeface="+mn-ea"/>
+                <a:cs typeface="+mn-cs"/>
+                <a:sym typeface="Arial"/>
+              </a:rPr>
+              <a:t>Theta = 0.1</a:t>
+            </a:r>
           </a:p>
         </p:txBody>
       </p:sp>

</xml_diff>